<commit_message>
Update features results fig
</commit_message>
<xml_diff>
--- a/yfcc100m/paper/vldb2020/figures/feature_img_results.pptx
+++ b/yfcc100m/paper/vldb2020/figures/feature_img_results.pptx
@@ -2982,15 +2982,14 @@
           </p:cNvPicPr>
           <p:nvPr/>
         </p:nvPicPr>
-        <p:blipFill>
+        <p:blipFill rotWithShape="1">
           <a:blip r:embed="rId2"/>
-          <a:stretch>
-            <a:fillRect/>
-          </a:stretch>
+          <a:srcRect r="3726"/>
+          <a:stretch/>
         </p:blipFill>
         <p:spPr>
           <a:xfrm>
-            <a:off x="5246841" y="412195"/>
+            <a:off x="5297072" y="412195"/>
             <a:ext cx="914400" cy="914400"/>
           </a:xfrm>
           <a:prstGeom prst="rect">
@@ -3012,15 +3011,14 @@
           </p:cNvPicPr>
           <p:nvPr/>
         </p:nvPicPr>
-        <p:blipFill>
+        <p:blipFill rotWithShape="1">
           <a:blip r:embed="rId3"/>
-          <a:stretch>
-            <a:fillRect/>
-          </a:stretch>
+          <a:srcRect l="2335" r="3501"/>
+          <a:stretch/>
         </p:blipFill>
         <p:spPr>
           <a:xfrm>
-            <a:off x="132010" y="412195"/>
+            <a:off x="153364" y="412195"/>
             <a:ext cx="914400" cy="914400"/>
           </a:xfrm>
           <a:prstGeom prst="rect">
@@ -3042,15 +3040,14 @@
           </p:cNvPicPr>
           <p:nvPr/>
         </p:nvPicPr>
-        <p:blipFill>
+        <p:blipFill rotWithShape="1">
           <a:blip r:embed="rId4"/>
-          <a:stretch>
-            <a:fillRect/>
-          </a:stretch>
+          <a:srcRect l="4561"/>
+          <a:stretch/>
         </p:blipFill>
         <p:spPr>
           <a:xfrm>
-            <a:off x="3244645" y="412195"/>
+            <a:off x="3274843" y="412195"/>
             <a:ext cx="914400" cy="914400"/>
           </a:xfrm>
           <a:prstGeom prst="rect">
@@ -3072,15 +3069,14 @@
           </p:cNvPicPr>
           <p:nvPr/>
         </p:nvPicPr>
-        <p:blipFill>
+        <p:blipFill rotWithShape="1">
           <a:blip r:embed="rId5"/>
-          <a:stretch>
-            <a:fillRect/>
-          </a:stretch>
+          <a:srcRect l="4560" b="4213"/>
+          <a:stretch/>
         </p:blipFill>
         <p:spPr>
           <a:xfrm>
-            <a:off x="2251672" y="412195"/>
+            <a:off x="2265732" y="412195"/>
             <a:ext cx="914400" cy="914400"/>
           </a:xfrm>
           <a:prstGeom prst="rect">
@@ -3110,7 +3106,7 @@
         </p:blipFill>
         <p:spPr>
           <a:xfrm>
-            <a:off x="4246246" y="412195"/>
+            <a:off x="4283954" y="412195"/>
             <a:ext cx="914400" cy="914400"/>
           </a:xfrm>
           <a:prstGeom prst="rect">
@@ -3132,15 +3128,14 @@
           </p:cNvPicPr>
           <p:nvPr/>
         </p:nvPicPr>
-        <p:blipFill>
+        <p:blipFill rotWithShape="1">
           <a:blip r:embed="rId7"/>
-          <a:stretch>
-            <a:fillRect/>
-          </a:stretch>
+          <a:srcRect t="5511" r="4451"/>
+          <a:stretch/>
         </p:blipFill>
         <p:spPr>
           <a:xfrm>
-            <a:off x="1257693" y="412321"/>
+            <a:off x="1259871" y="412195"/>
             <a:ext cx="914400" cy="914400"/>
           </a:xfrm>
           <a:prstGeom prst="rect">
@@ -3162,15 +3157,14 @@
           </p:cNvPicPr>
           <p:nvPr/>
         </p:nvPicPr>
-        <p:blipFill>
+        <p:blipFill rotWithShape="1">
           <a:blip r:embed="rId8"/>
-          <a:stretch>
-            <a:fillRect/>
-          </a:stretch>
+          <a:srcRect t="7500"/>
+          <a:stretch/>
         </p:blipFill>
         <p:spPr>
           <a:xfrm>
-            <a:off x="6247436" y="412195"/>
+            <a:off x="6310190" y="412195"/>
             <a:ext cx="914400" cy="914400"/>
           </a:xfrm>
           <a:prstGeom prst="rect">
@@ -3270,7 +3264,7 @@
         </p:blipFill>
         <p:spPr>
           <a:xfrm>
-            <a:off x="4246246" y="1484482"/>
+            <a:off x="4283954" y="1484419"/>
             <a:ext cx="914400" cy="914400"/>
           </a:xfrm>
           <a:prstGeom prst="rect">
@@ -3300,7 +3294,7 @@
         </p:blipFill>
         <p:spPr>
           <a:xfrm>
-            <a:off x="6247436" y="1484482"/>
+            <a:off x="6310190" y="1484419"/>
             <a:ext cx="914400" cy="914400"/>
           </a:xfrm>
           <a:prstGeom prst="rect">
@@ -3322,15 +3316,14 @@
           </p:cNvPicPr>
           <p:nvPr/>
         </p:nvPicPr>
-        <p:blipFill>
+        <p:blipFill rotWithShape="1">
           <a:blip r:embed="rId11"/>
-          <a:stretch>
-            <a:fillRect/>
-          </a:stretch>
+          <a:srcRect l="1347"/>
+          <a:stretch/>
         </p:blipFill>
         <p:spPr>
           <a:xfrm>
-            <a:off x="3243473" y="1484482"/>
+            <a:off x="3274843" y="1484419"/>
             <a:ext cx="914400" cy="914400"/>
           </a:xfrm>
           <a:prstGeom prst="rect">
@@ -3360,7 +3353,7 @@
         </p:blipFill>
         <p:spPr>
           <a:xfrm>
-            <a:off x="5240684" y="1484482"/>
+            <a:off x="5297072" y="1484419"/>
             <a:ext cx="914400" cy="914400"/>
           </a:xfrm>
           <a:prstGeom prst="rect">
@@ -3382,15 +3375,14 @@
           </p:cNvPicPr>
           <p:nvPr/>
         </p:nvPicPr>
-        <p:blipFill>
+        <p:blipFill rotWithShape="1">
           <a:blip r:embed="rId13"/>
-          <a:stretch>
-            <a:fillRect/>
-          </a:stretch>
+          <a:srcRect t="4163" r="1635"/>
+          <a:stretch/>
         </p:blipFill>
         <p:spPr>
           <a:xfrm>
-            <a:off x="2251672" y="1484482"/>
+            <a:off x="2265732" y="1484419"/>
             <a:ext cx="914400" cy="914400"/>
           </a:xfrm>
           <a:prstGeom prst="rect">
@@ -3412,15 +3404,14 @@
           </p:cNvPicPr>
           <p:nvPr/>
         </p:nvPicPr>
-        <p:blipFill>
+        <p:blipFill rotWithShape="1">
           <a:blip r:embed="rId14"/>
-          <a:stretch>
-            <a:fillRect/>
-          </a:stretch>
+          <a:srcRect t="3684" r="4288"/>
+          <a:stretch/>
         </p:blipFill>
         <p:spPr>
           <a:xfrm>
-            <a:off x="1259871" y="1484482"/>
+            <a:off x="1259871" y="1484419"/>
             <a:ext cx="914400" cy="914400"/>
           </a:xfrm>
           <a:prstGeom prst="rect">
@@ -3442,15 +3433,14 @@
           </p:cNvPicPr>
           <p:nvPr/>
         </p:nvPicPr>
-        <p:blipFill>
+        <p:blipFill rotWithShape="1">
           <a:blip r:embed="rId15"/>
-          <a:stretch>
-            <a:fillRect/>
-          </a:stretch>
+          <a:srcRect l="-1" r="3501"/>
+          <a:stretch/>
         </p:blipFill>
         <p:spPr>
           <a:xfrm>
-            <a:off x="132010" y="1484482"/>
+            <a:off x="153364" y="1484419"/>
             <a:ext cx="914400" cy="914400"/>
           </a:xfrm>
           <a:prstGeom prst="rect">
@@ -3474,7 +3464,7 @@
         </p:nvCxnSpPr>
         <p:spPr>
           <a:xfrm flipV="1">
-            <a:off x="1133687" y="190706"/>
+            <a:off x="1152541" y="190706"/>
             <a:ext cx="0" cy="3382674"/>
           </a:xfrm>
           <a:prstGeom prst="line">
@@ -3518,7 +3508,7 @@
         </p:blipFill>
         <p:spPr>
           <a:xfrm>
-            <a:off x="6247436" y="2556643"/>
+            <a:off x="6306860" y="2553909"/>
             <a:ext cx="914400" cy="914400"/>
           </a:xfrm>
           <a:prstGeom prst="rect">
@@ -3540,15 +3530,14 @@
           </p:cNvPicPr>
           <p:nvPr/>
         </p:nvPicPr>
-        <p:blipFill>
+        <p:blipFill rotWithShape="1">
           <a:blip r:embed="rId17"/>
-          <a:stretch>
-            <a:fillRect/>
-          </a:stretch>
+          <a:srcRect l="3164" t="4134" r="4348"/>
+          <a:stretch/>
         </p:blipFill>
         <p:spPr>
           <a:xfrm>
-            <a:off x="1252973" y="2556643"/>
+            <a:off x="1259871" y="2556643"/>
             <a:ext cx="914400" cy="914400"/>
           </a:xfrm>
           <a:prstGeom prst="rect">
@@ -3570,15 +3559,14 @@
           </p:cNvPicPr>
           <p:nvPr/>
         </p:nvPicPr>
-        <p:blipFill>
+        <p:blipFill rotWithShape="1">
           <a:blip r:embed="rId18"/>
-          <a:stretch>
-            <a:fillRect/>
-          </a:stretch>
+          <a:srcRect l="2070"/>
+          <a:stretch/>
         </p:blipFill>
         <p:spPr>
           <a:xfrm>
-            <a:off x="5240684" y="2556643"/>
+            <a:off x="5297072" y="2560601"/>
             <a:ext cx="914400" cy="914400"/>
           </a:xfrm>
           <a:prstGeom prst="rect">
@@ -3600,15 +3588,14 @@
           </p:cNvPicPr>
           <p:nvPr/>
         </p:nvPicPr>
-        <p:blipFill>
+        <p:blipFill rotWithShape="1">
           <a:blip r:embed="rId19"/>
-          <a:stretch>
-            <a:fillRect/>
-          </a:stretch>
+          <a:srcRect l="2233" t="3651" r="4258"/>
+          <a:stretch/>
         </p:blipFill>
         <p:spPr>
           <a:xfrm>
-            <a:off x="132035" y="2557804"/>
+            <a:off x="153364" y="2556643"/>
             <a:ext cx="914400" cy="914400"/>
           </a:xfrm>
           <a:prstGeom prst="rect">
@@ -3630,15 +3617,14 @@
           </p:cNvPicPr>
           <p:nvPr/>
         </p:nvPicPr>
-        <p:blipFill>
+        <p:blipFill rotWithShape="1">
           <a:blip r:embed="rId20"/>
-          <a:stretch>
-            <a:fillRect/>
-          </a:stretch>
+          <a:srcRect t="8031" r="6486"/>
+          <a:stretch/>
         </p:blipFill>
         <p:spPr>
           <a:xfrm>
-            <a:off x="2251672" y="2556643"/>
+            <a:off x="2261048" y="2556643"/>
             <a:ext cx="914400" cy="914400"/>
           </a:xfrm>
           <a:prstGeom prst="rect">
@@ -3660,15 +3646,14 @@
           </p:cNvPicPr>
           <p:nvPr/>
         </p:nvPicPr>
-        <p:blipFill>
+        <p:blipFill rotWithShape="1">
           <a:blip r:embed="rId21"/>
-          <a:stretch>
-            <a:fillRect/>
-          </a:stretch>
+          <a:srcRect l="881" r="1710"/>
+          <a:stretch/>
         </p:blipFill>
         <p:spPr>
           <a:xfrm>
-            <a:off x="3250371" y="2556643"/>
+            <a:off x="3274166" y="2556643"/>
             <a:ext cx="914400" cy="914400"/>
           </a:xfrm>
           <a:prstGeom prst="rect">
@@ -3690,15 +3675,14 @@
           </p:cNvPicPr>
           <p:nvPr/>
         </p:nvPicPr>
-        <p:blipFill>
+        <p:blipFill rotWithShape="1">
           <a:blip r:embed="rId22"/>
-          <a:stretch>
-            <a:fillRect/>
-          </a:stretch>
+          <a:srcRect l="2070"/>
+          <a:stretch/>
         </p:blipFill>
         <p:spPr>
           <a:xfrm>
-            <a:off x="4246246" y="2556643"/>
+            <a:off x="4283954" y="2553909"/>
             <a:ext cx="914400" cy="914400"/>
           </a:xfrm>
           <a:prstGeom prst="rect">

</xml_diff>